<commit_message>
First version of workflow 2 module
</commit_message>
<xml_diff>
--- a/figures/resources/workflow_segment_2d_nuclei_measure_shape.pptx
+++ b/figures/resources/workflow_segment_2d_nuclei_measure_shape.pptx
@@ -109,6 +109,11 @@
       </a:defRPr>
     </a:lvl9pPr>
   </p:defaultTextStyle>
+  <p:extLst>
+    <p:ext uri="{EFAFB233-063F-42B5-8137-9DF3F51BA10A}">
+      <p15:sldGuideLst xmlns:p15="http://schemas.microsoft.com/office/powerpoint/2012/main"/>
+    </p:ext>
+  </p:extLst>
 </p:presentation>
 </file>
 
@@ -194,7 +199,7 @@
           <a:p>
             <a:fld id="{A676EEBB-206A-7E41-8B7D-48AD9B178BB5}" type="datetimeFigureOut">
               <a:rPr lang="de-DE" smtClean="0"/>
-              <a:t>18.01.21</a:t>
+              <a:t>26.01.21</a:t>
             </a:fld>
             <a:endParaRPr lang="de-DE"/>
           </a:p>
@@ -695,7 +700,7 @@
           <a:p>
             <a:fld id="{48BA9A08-24AA-1F48-8505-95D4F814D212}" type="datetimeFigureOut">
               <a:rPr lang="de-DE" smtClean="0"/>
-              <a:t>18.01.21</a:t>
+              <a:t>26.01.21</a:t>
             </a:fld>
             <a:endParaRPr lang="de-DE"/>
           </a:p>
@@ -895,7 +900,7 @@
           <a:p>
             <a:fld id="{48BA9A08-24AA-1F48-8505-95D4F814D212}" type="datetimeFigureOut">
               <a:rPr lang="de-DE" smtClean="0"/>
-              <a:t>18.01.21</a:t>
+              <a:t>26.01.21</a:t>
             </a:fld>
             <a:endParaRPr lang="de-DE"/>
           </a:p>
@@ -1105,7 +1110,7 @@
           <a:p>
             <a:fld id="{48BA9A08-24AA-1F48-8505-95D4F814D212}" type="datetimeFigureOut">
               <a:rPr lang="de-DE" smtClean="0"/>
-              <a:t>18.01.21</a:t>
+              <a:t>26.01.21</a:t>
             </a:fld>
             <a:endParaRPr lang="de-DE"/>
           </a:p>
@@ -1305,7 +1310,7 @@
           <a:p>
             <a:fld id="{48BA9A08-24AA-1F48-8505-95D4F814D212}" type="datetimeFigureOut">
               <a:rPr lang="de-DE" smtClean="0"/>
-              <a:t>18.01.21</a:t>
+              <a:t>26.01.21</a:t>
             </a:fld>
             <a:endParaRPr lang="de-DE"/>
           </a:p>
@@ -1581,7 +1586,7 @@
           <a:p>
             <a:fld id="{48BA9A08-24AA-1F48-8505-95D4F814D212}" type="datetimeFigureOut">
               <a:rPr lang="de-DE" smtClean="0"/>
-              <a:t>18.01.21</a:t>
+              <a:t>26.01.21</a:t>
             </a:fld>
             <a:endParaRPr lang="de-DE"/>
           </a:p>
@@ -1849,7 +1854,7 @@
           <a:p>
             <a:fld id="{48BA9A08-24AA-1F48-8505-95D4F814D212}" type="datetimeFigureOut">
               <a:rPr lang="de-DE" smtClean="0"/>
-              <a:t>18.01.21</a:t>
+              <a:t>26.01.21</a:t>
             </a:fld>
             <a:endParaRPr lang="de-DE"/>
           </a:p>
@@ -2264,7 +2269,7 @@
           <a:p>
             <a:fld id="{48BA9A08-24AA-1F48-8505-95D4F814D212}" type="datetimeFigureOut">
               <a:rPr lang="de-DE" smtClean="0"/>
-              <a:t>18.01.21</a:t>
+              <a:t>26.01.21</a:t>
             </a:fld>
             <a:endParaRPr lang="de-DE"/>
           </a:p>
@@ -2406,7 +2411,7 @@
           <a:p>
             <a:fld id="{48BA9A08-24AA-1F48-8505-95D4F814D212}" type="datetimeFigureOut">
               <a:rPr lang="de-DE" smtClean="0"/>
-              <a:t>18.01.21</a:t>
+              <a:t>26.01.21</a:t>
             </a:fld>
             <a:endParaRPr lang="de-DE"/>
           </a:p>
@@ -2519,7 +2524,7 @@
           <a:p>
             <a:fld id="{48BA9A08-24AA-1F48-8505-95D4F814D212}" type="datetimeFigureOut">
               <a:rPr lang="de-DE" smtClean="0"/>
-              <a:t>18.01.21</a:t>
+              <a:t>26.01.21</a:t>
             </a:fld>
             <a:endParaRPr lang="de-DE"/>
           </a:p>
@@ -2832,7 +2837,7 @@
           <a:p>
             <a:fld id="{48BA9A08-24AA-1F48-8505-95D4F814D212}" type="datetimeFigureOut">
               <a:rPr lang="de-DE" smtClean="0"/>
-              <a:t>18.01.21</a:t>
+              <a:t>26.01.21</a:t>
             </a:fld>
             <a:endParaRPr lang="de-DE"/>
           </a:p>
@@ -3121,7 +3126,7 @@
           <a:p>
             <a:fld id="{48BA9A08-24AA-1F48-8505-95D4F814D212}" type="datetimeFigureOut">
               <a:rPr lang="de-DE" smtClean="0"/>
-              <a:t>18.01.21</a:t>
+              <a:t>26.01.21</a:t>
             </a:fld>
             <a:endParaRPr lang="de-DE"/>
           </a:p>
@@ -3364,7 +3369,7 @@
           <a:p>
             <a:fld id="{48BA9A08-24AA-1F48-8505-95D4F814D212}" type="datetimeFigureOut">
               <a:rPr lang="de-DE" smtClean="0"/>
-              <a:t>18.01.21</a:t>
+              <a:t>26.01.21</a:t>
             </a:fld>
             <a:endParaRPr lang="de-DE"/>
           </a:p>
@@ -3804,7 +3809,7 @@
           <a:p>
             <a:r>
               <a:rPr lang="de-DE" dirty="0"/>
-              <a:t>workflow_segment_2d_nuclei_measure_shape</a:t>
+              <a:t>workflow_segment_2d_noisy_nuclei_and_filter_objects</a:t>
             </a:r>
           </a:p>
         </p:txBody>
@@ -3866,10 +3871,10 @@
       </p:grpSpPr>
       <p:pic>
         <p:nvPicPr>
-          <p:cNvPr id="4" name="Picture 3">
-            <a:extLst>
-              <a:ext uri="{FF2B5EF4-FFF2-40B4-BE49-F238E27FC236}">
-                <a16:creationId xmlns:a16="http://schemas.microsoft.com/office/drawing/2014/main" id="{E3122E3A-90A7-1740-8EBE-E17DDFF2EB34}"/>
+          <p:cNvPr id="3" name="Picture 2">
+            <a:extLst>
+              <a:ext uri="{FF2B5EF4-FFF2-40B4-BE49-F238E27FC236}">
+                <a16:creationId xmlns:a16="http://schemas.microsoft.com/office/drawing/2014/main" id="{C32937E5-70EE-9C43-BA6D-33AD7B1A1BAE}"/>
               </a:ext>
             </a:extLst>
           </p:cNvPr>
@@ -3886,20 +3891,140 @@
         </p:blipFill>
         <p:spPr>
           <a:xfrm>
-            <a:off x="808681" y="1158240"/>
-            <a:ext cx="3008073" cy="4227322"/>
+            <a:off x="9508299" y="1402180"/>
+            <a:ext cx="2895600" cy="3441700"/>
           </a:xfrm>
           <a:prstGeom prst="rect">
             <a:avLst/>
           </a:prstGeom>
         </p:spPr>
       </p:pic>
+      <p:sp>
+        <p:nvSpPr>
+          <p:cNvPr id="6" name="TextBox 5">
+            <a:extLst>
+              <a:ext uri="{FF2B5EF4-FFF2-40B4-BE49-F238E27FC236}">
+                <a16:creationId xmlns:a16="http://schemas.microsoft.com/office/drawing/2014/main" id="{68D9BC5E-70B4-2B48-B0B1-5EE3151C9464}"/>
+              </a:ext>
+            </a:extLst>
+          </p:cNvPr>
+          <p:cNvSpPr txBox="1"/>
+          <p:nvPr/>
+        </p:nvSpPr>
+        <p:spPr>
+          <a:xfrm>
+            <a:off x="1064713" y="194933"/>
+            <a:ext cx="7438190" cy="369332"/>
+          </a:xfrm>
+          <a:prstGeom prst="rect">
+            <a:avLst/>
+          </a:prstGeom>
+          <a:noFill/>
+        </p:spPr>
+        <p:txBody>
+          <a:bodyPr wrap="none" rtlCol="0">
+            <a:spAutoFit/>
+          </a:bodyPr>
+          <a:lstStyle/>
+          <a:p>
+            <a:r>
+              <a:rPr lang="de-DE" dirty="0"/>
+              <a:t>The </a:t>
+            </a:r>
+            <a:r>
+              <a:rPr lang="de-DE" dirty="0" err="1"/>
+              <a:t>figures</a:t>
+            </a:r>
+            <a:r>
+              <a:rPr lang="de-DE" dirty="0"/>
+              <a:t> </a:t>
+            </a:r>
+            <a:r>
+              <a:rPr lang="de-DE" dirty="0" err="1"/>
+              <a:t>are</a:t>
+            </a:r>
+            <a:r>
+              <a:rPr lang="de-DE" dirty="0"/>
+              <a:t> </a:t>
+            </a:r>
+            <a:r>
+              <a:rPr lang="de-DE" dirty="0" err="1"/>
+              <a:t>autogenerated</a:t>
+            </a:r>
+            <a:r>
+              <a:rPr lang="de-DE" dirty="0"/>
+              <a:t> </a:t>
+            </a:r>
+            <a:r>
+              <a:rPr lang="de-DE" dirty="0" err="1"/>
+              <a:t>from</a:t>
+            </a:r>
+            <a:r>
+              <a:rPr lang="de-DE" dirty="0"/>
+              <a:t> </a:t>
+            </a:r>
+            <a:r>
+              <a:rPr lang="de-DE" dirty="0" err="1"/>
+              <a:t>the</a:t>
+            </a:r>
+            <a:r>
+              <a:rPr lang="de-DE" dirty="0"/>
+              <a:t> </a:t>
+            </a:r>
+            <a:r>
+              <a:rPr lang="de-DE" dirty="0" err="1"/>
+              <a:t>ImageJ</a:t>
+            </a:r>
+            <a:r>
+              <a:rPr lang="de-DE" dirty="0"/>
+              <a:t> </a:t>
+            </a:r>
+            <a:r>
+              <a:rPr lang="de-DE" dirty="0" err="1"/>
+              <a:t>macro</a:t>
+            </a:r>
+            <a:r>
+              <a:rPr lang="de-DE" dirty="0"/>
+              <a:t> </a:t>
+            </a:r>
+            <a:r>
+              <a:rPr lang="de-DE" dirty="0" err="1"/>
+              <a:t>of</a:t>
+            </a:r>
+            <a:r>
+              <a:rPr lang="de-DE" dirty="0"/>
+              <a:t> </a:t>
+            </a:r>
+            <a:r>
+              <a:rPr lang="de-DE" dirty="0" err="1"/>
+              <a:t>the</a:t>
+            </a:r>
+            <a:r>
+              <a:rPr lang="de-DE" dirty="0"/>
+              <a:t> </a:t>
+            </a:r>
+            <a:r>
+              <a:rPr lang="de-DE" dirty="0" err="1"/>
+              <a:t>module</a:t>
+            </a:r>
+            <a:r>
+              <a:rPr lang="de-DE" dirty="0"/>
+              <a:t> </a:t>
+            </a:r>
+            <a:r>
+              <a:rPr lang="de-DE" dirty="0" err="1"/>
+              <a:t>activity</a:t>
+            </a:r>
+            <a:endParaRPr lang="de-DE" dirty="0"/>
+          </a:p>
+        </p:txBody>
+      </p:sp>
       <p:pic>
         <p:nvPicPr>
-          <p:cNvPr id="5" name="Picture 4">
-            <a:extLst>
-              <a:ext uri="{FF2B5EF4-FFF2-40B4-BE49-F238E27FC236}">
-                <a16:creationId xmlns:a16="http://schemas.microsoft.com/office/drawing/2014/main" id="{CD54CDE8-FE5C-9E48-B2F7-1FCCEA443569}"/>
+          <p:cNvPr id="8" name="Picture 7">
+            <a:extLst>
+              <a:ext uri="{FF2B5EF4-FFF2-40B4-BE49-F238E27FC236}">
+                <a16:creationId xmlns:a16="http://schemas.microsoft.com/office/drawing/2014/main" id="{9890B577-F2BB-2649-ABA6-349DF8E50611}"/>
               </a:ext>
             </a:extLst>
           </p:cNvPr>
@@ -3916,8 +4041,8 @@
         </p:blipFill>
         <p:spPr>
           <a:xfrm>
-            <a:off x="3368850" y="1158240"/>
-            <a:ext cx="3008073" cy="4227322"/>
+            <a:off x="9508299" y="3569569"/>
+            <a:ext cx="3022600" cy="3225800"/>
           </a:xfrm>
           <a:prstGeom prst="rect">
             <a:avLst/>
@@ -3926,10 +4051,10 @@
       </p:pic>
       <p:pic>
         <p:nvPicPr>
-          <p:cNvPr id="7" name="Picture 6">
-            <a:extLst>
-              <a:ext uri="{FF2B5EF4-FFF2-40B4-BE49-F238E27FC236}">
-                <a16:creationId xmlns:a16="http://schemas.microsoft.com/office/drawing/2014/main" id="{9F98B96C-1659-694A-BA0E-C473CB207273}"/>
+          <p:cNvPr id="10" name="Picture 9">
+            <a:extLst>
+              <a:ext uri="{FF2B5EF4-FFF2-40B4-BE49-F238E27FC236}">
+                <a16:creationId xmlns:a16="http://schemas.microsoft.com/office/drawing/2014/main" id="{37BD6D36-032B-CE40-89B2-95D40061FC96}"/>
               </a:ext>
             </a:extLst>
           </p:cNvPr>
@@ -3946,8 +4071,8 @@
         </p:blipFill>
         <p:spPr>
           <a:xfrm>
-            <a:off x="8452384" y="1718916"/>
-            <a:ext cx="2776683" cy="3666646"/>
+            <a:off x="150312" y="4089666"/>
+            <a:ext cx="9874025" cy="1751593"/>
           </a:xfrm>
           <a:prstGeom prst="rect">
             <a:avLst/>
@@ -3956,10 +4081,10 @@
       </p:pic>
       <p:pic>
         <p:nvPicPr>
-          <p:cNvPr id="9" name="Picture 8">
-            <a:extLst>
-              <a:ext uri="{FF2B5EF4-FFF2-40B4-BE49-F238E27FC236}">
-                <a16:creationId xmlns:a16="http://schemas.microsoft.com/office/drawing/2014/main" id="{E0117D3F-FA97-FD45-96FE-45151738E3E8}"/>
+          <p:cNvPr id="11" name="Picture 10">
+            <a:extLst>
+              <a:ext uri="{FF2B5EF4-FFF2-40B4-BE49-F238E27FC236}">
+                <a16:creationId xmlns:a16="http://schemas.microsoft.com/office/drawing/2014/main" id="{8AF67929-1E92-D34F-AEB3-51AEF66E6917}"/>
               </a:ext>
             </a:extLst>
           </p:cNvPr>
@@ -3976,8 +4101,8 @@
         </p:blipFill>
         <p:spPr>
           <a:xfrm>
-            <a:off x="5958823" y="1158240"/>
-            <a:ext cx="3008073" cy="4227322"/>
+            <a:off x="150312" y="1920475"/>
+            <a:ext cx="9874025" cy="2028594"/>
           </a:xfrm>
           <a:prstGeom prst="rect">
             <a:avLst/>
@@ -4014,126 +4139,6 @@
           <a:chExt cx="0" cy="0"/>
         </a:xfrm>
       </p:grpSpPr>
-      <p:pic>
-        <p:nvPicPr>
-          <p:cNvPr id="4" name="Picture 3">
-            <a:extLst>
-              <a:ext uri="{FF2B5EF4-FFF2-40B4-BE49-F238E27FC236}">
-                <a16:creationId xmlns:a16="http://schemas.microsoft.com/office/drawing/2014/main" id="{CA5574E0-DD2F-3B47-8723-3D7ABE5EC301}"/>
-              </a:ext>
-            </a:extLst>
-          </p:cNvPr>
-          <p:cNvPicPr>
-            <a:picLocks noChangeAspect="1"/>
-          </p:cNvPicPr>
-          <p:nvPr/>
-        </p:nvPicPr>
-        <p:blipFill>
-          <a:blip r:embed="rId2"/>
-          <a:stretch>
-            <a:fillRect/>
-          </a:stretch>
-        </p:blipFill>
-        <p:spPr>
-          <a:xfrm>
-            <a:off x="904296" y="1231392"/>
-            <a:ext cx="3325312" cy="4517898"/>
-          </a:xfrm>
-          <a:prstGeom prst="rect">
-            <a:avLst/>
-          </a:prstGeom>
-        </p:spPr>
-      </p:pic>
-      <p:pic>
-        <p:nvPicPr>
-          <p:cNvPr id="5" name="Picture 4">
-            <a:extLst>
-              <a:ext uri="{FF2B5EF4-FFF2-40B4-BE49-F238E27FC236}">
-                <a16:creationId xmlns:a16="http://schemas.microsoft.com/office/drawing/2014/main" id="{2F66A0A1-5395-1342-AD70-E8BA899147B7}"/>
-              </a:ext>
-            </a:extLst>
-          </p:cNvPr>
-          <p:cNvPicPr>
-            <a:picLocks noChangeAspect="1"/>
-          </p:cNvPicPr>
-          <p:nvPr/>
-        </p:nvPicPr>
-        <p:blipFill>
-          <a:blip r:embed="rId3"/>
-          <a:stretch>
-            <a:fillRect/>
-          </a:stretch>
-        </p:blipFill>
-        <p:spPr>
-          <a:xfrm>
-            <a:off x="3440740" y="1225296"/>
-            <a:ext cx="3325312" cy="4517898"/>
-          </a:xfrm>
-          <a:prstGeom prst="rect">
-            <a:avLst/>
-          </a:prstGeom>
-        </p:spPr>
-      </p:pic>
-      <p:pic>
-        <p:nvPicPr>
-          <p:cNvPr id="6" name="Picture 5">
-            <a:extLst>
-              <a:ext uri="{FF2B5EF4-FFF2-40B4-BE49-F238E27FC236}">
-                <a16:creationId xmlns:a16="http://schemas.microsoft.com/office/drawing/2014/main" id="{40288B02-DC53-3F4F-9CA3-6AAAF21B614C}"/>
-              </a:ext>
-            </a:extLst>
-          </p:cNvPr>
-          <p:cNvPicPr>
-            <a:picLocks noChangeAspect="1"/>
-          </p:cNvPicPr>
-          <p:nvPr/>
-        </p:nvPicPr>
-        <p:blipFill>
-          <a:blip r:embed="rId4"/>
-          <a:stretch>
-            <a:fillRect/>
-          </a:stretch>
-        </p:blipFill>
-        <p:spPr>
-          <a:xfrm>
-            <a:off x="5977184" y="1225296"/>
-            <a:ext cx="3325312" cy="4517898"/>
-          </a:xfrm>
-          <a:prstGeom prst="rect">
-            <a:avLst/>
-          </a:prstGeom>
-        </p:spPr>
-      </p:pic>
-      <p:pic>
-        <p:nvPicPr>
-          <p:cNvPr id="7" name="Picture 6">
-            <a:extLst>
-              <a:ext uri="{FF2B5EF4-FFF2-40B4-BE49-F238E27FC236}">
-                <a16:creationId xmlns:a16="http://schemas.microsoft.com/office/drawing/2014/main" id="{FCB8EB36-6357-154E-969B-C78EBCCBFDD4}"/>
-              </a:ext>
-            </a:extLst>
-          </p:cNvPr>
-          <p:cNvPicPr>
-            <a:picLocks noChangeAspect="1"/>
-          </p:cNvPicPr>
-          <p:nvPr/>
-        </p:nvPicPr>
-        <p:blipFill>
-          <a:blip r:embed="rId5"/>
-          <a:stretch>
-            <a:fillRect/>
-          </a:stretch>
-        </p:blipFill>
-        <p:spPr>
-          <a:xfrm>
-            <a:off x="8513628" y="1691014"/>
-            <a:ext cx="2715962" cy="3586462"/>
-          </a:xfrm>
-          <a:prstGeom prst="rect">
-            <a:avLst/>
-          </a:prstGeom>
-        </p:spPr>
-      </p:pic>
     </p:spTree>
     <p:extLst>
       <p:ext uri="{BB962C8B-B14F-4D97-AF65-F5344CB8AC3E}">

</xml_diff>

<commit_message>
Improve basic workflow figure and title
</commit_message>
<xml_diff>
--- a/figures/resources/workflow_segment_2d_nuclei_measure_shape.pptx
+++ b/figures/resources/workflow_segment_2d_nuclei_measure_shape.pptx
@@ -109,6 +109,11 @@
       </a:defRPr>
     </a:lvl9pPr>
   </p:defaultTextStyle>
+  <p:extLst>
+    <p:ext uri="{EFAFB233-063F-42B5-8137-9DF3F51BA10A}">
+      <p15:sldGuideLst xmlns:p15="http://schemas.microsoft.com/office/powerpoint/2012/main"/>
+    </p:ext>
+  </p:extLst>
 </p:presentation>
 </file>
 
@@ -194,7 +199,7 @@
           <a:p>
             <a:fld id="{A676EEBB-206A-7E41-8B7D-48AD9B178BB5}" type="datetimeFigureOut">
               <a:rPr lang="de-DE" smtClean="0"/>
-              <a:t>18.01.21</a:t>
+              <a:t>17.03.22</a:t>
             </a:fld>
             <a:endParaRPr lang="de-DE"/>
           </a:p>
@@ -695,7 +700,7 @@
           <a:p>
             <a:fld id="{48BA9A08-24AA-1F48-8505-95D4F814D212}" type="datetimeFigureOut">
               <a:rPr lang="de-DE" smtClean="0"/>
-              <a:t>18.01.21</a:t>
+              <a:t>17.03.22</a:t>
             </a:fld>
             <a:endParaRPr lang="de-DE"/>
           </a:p>
@@ -895,7 +900,7 @@
           <a:p>
             <a:fld id="{48BA9A08-24AA-1F48-8505-95D4F814D212}" type="datetimeFigureOut">
               <a:rPr lang="de-DE" smtClean="0"/>
-              <a:t>18.01.21</a:t>
+              <a:t>17.03.22</a:t>
             </a:fld>
             <a:endParaRPr lang="de-DE"/>
           </a:p>
@@ -1105,7 +1110,7 @@
           <a:p>
             <a:fld id="{48BA9A08-24AA-1F48-8505-95D4F814D212}" type="datetimeFigureOut">
               <a:rPr lang="de-DE" smtClean="0"/>
-              <a:t>18.01.21</a:t>
+              <a:t>17.03.22</a:t>
             </a:fld>
             <a:endParaRPr lang="de-DE"/>
           </a:p>
@@ -1305,7 +1310,7 @@
           <a:p>
             <a:fld id="{48BA9A08-24AA-1F48-8505-95D4F814D212}" type="datetimeFigureOut">
               <a:rPr lang="de-DE" smtClean="0"/>
-              <a:t>18.01.21</a:t>
+              <a:t>17.03.22</a:t>
             </a:fld>
             <a:endParaRPr lang="de-DE"/>
           </a:p>
@@ -1581,7 +1586,7 @@
           <a:p>
             <a:fld id="{48BA9A08-24AA-1F48-8505-95D4F814D212}" type="datetimeFigureOut">
               <a:rPr lang="de-DE" smtClean="0"/>
-              <a:t>18.01.21</a:t>
+              <a:t>17.03.22</a:t>
             </a:fld>
             <a:endParaRPr lang="de-DE"/>
           </a:p>
@@ -1849,7 +1854,7 @@
           <a:p>
             <a:fld id="{48BA9A08-24AA-1F48-8505-95D4F814D212}" type="datetimeFigureOut">
               <a:rPr lang="de-DE" smtClean="0"/>
-              <a:t>18.01.21</a:t>
+              <a:t>17.03.22</a:t>
             </a:fld>
             <a:endParaRPr lang="de-DE"/>
           </a:p>
@@ -2264,7 +2269,7 @@
           <a:p>
             <a:fld id="{48BA9A08-24AA-1F48-8505-95D4F814D212}" type="datetimeFigureOut">
               <a:rPr lang="de-DE" smtClean="0"/>
-              <a:t>18.01.21</a:t>
+              <a:t>17.03.22</a:t>
             </a:fld>
             <a:endParaRPr lang="de-DE"/>
           </a:p>
@@ -2406,7 +2411,7 @@
           <a:p>
             <a:fld id="{48BA9A08-24AA-1F48-8505-95D4F814D212}" type="datetimeFigureOut">
               <a:rPr lang="de-DE" smtClean="0"/>
-              <a:t>18.01.21</a:t>
+              <a:t>17.03.22</a:t>
             </a:fld>
             <a:endParaRPr lang="de-DE"/>
           </a:p>
@@ -2519,7 +2524,7 @@
           <a:p>
             <a:fld id="{48BA9A08-24AA-1F48-8505-95D4F814D212}" type="datetimeFigureOut">
               <a:rPr lang="de-DE" smtClean="0"/>
-              <a:t>18.01.21</a:t>
+              <a:t>17.03.22</a:t>
             </a:fld>
             <a:endParaRPr lang="de-DE"/>
           </a:p>
@@ -2832,7 +2837,7 @@
           <a:p>
             <a:fld id="{48BA9A08-24AA-1F48-8505-95D4F814D212}" type="datetimeFigureOut">
               <a:rPr lang="de-DE" smtClean="0"/>
-              <a:t>18.01.21</a:t>
+              <a:t>17.03.22</a:t>
             </a:fld>
             <a:endParaRPr lang="de-DE"/>
           </a:p>
@@ -3121,7 +3126,7 @@
           <a:p>
             <a:fld id="{48BA9A08-24AA-1F48-8505-95D4F814D212}" type="datetimeFigureOut">
               <a:rPr lang="de-DE" smtClean="0"/>
-              <a:t>18.01.21</a:t>
+              <a:t>17.03.22</a:t>
             </a:fld>
             <a:endParaRPr lang="de-DE"/>
           </a:p>
@@ -3364,7 +3369,7 @@
           <a:p>
             <a:fld id="{48BA9A08-24AA-1F48-8505-95D4F814D212}" type="datetimeFigureOut">
               <a:rPr lang="de-DE" smtClean="0"/>
-              <a:t>18.01.21</a:t>
+              <a:t>17.03.22</a:t>
             </a:fld>
             <a:endParaRPr lang="de-DE"/>
           </a:p>
@@ -3864,126 +3869,563 @@
           <a:chExt cx="0" cy="0"/>
         </a:xfrm>
       </p:grpSpPr>
-      <p:pic>
-        <p:nvPicPr>
-          <p:cNvPr id="4" name="Picture 3">
-            <a:extLst>
-              <a:ext uri="{FF2B5EF4-FFF2-40B4-BE49-F238E27FC236}">
-                <a16:creationId xmlns:a16="http://schemas.microsoft.com/office/drawing/2014/main" id="{E3122E3A-90A7-1740-8EBE-E17DDFF2EB34}"/>
-              </a:ext>
-            </a:extLst>
-          </p:cNvPr>
-          <p:cNvPicPr>
-            <a:picLocks noChangeAspect="1"/>
-          </p:cNvPicPr>
+      <p:grpSp>
+        <p:nvGrpSpPr>
+          <p:cNvPr id="3" name="Group 2">
+            <a:extLst>
+              <a:ext uri="{FF2B5EF4-FFF2-40B4-BE49-F238E27FC236}">
+                <a16:creationId xmlns:a16="http://schemas.microsoft.com/office/drawing/2014/main" id="{5019090B-48A3-C040-BD53-98359E5FB781}"/>
+              </a:ext>
+            </a:extLst>
+          </p:cNvPr>
+          <p:cNvGrpSpPr/>
           <p:nvPr/>
-        </p:nvPicPr>
-        <p:blipFill>
-          <a:blip r:embed="rId3"/>
-          <a:stretch>
-            <a:fillRect/>
-          </a:stretch>
-        </p:blipFill>
-        <p:spPr>
+        </p:nvGrpSpPr>
+        <p:grpSpPr>
           <a:xfrm>
-            <a:off x="808681" y="1158240"/>
-            <a:ext cx="3008073" cy="4227322"/>
+            <a:off x="660400" y="541867"/>
+            <a:ext cx="10261600" cy="4478428"/>
+            <a:chOff x="660400" y="2042080"/>
+            <a:chExt cx="6869657" cy="3051935"/>
           </a:xfrm>
-          <a:prstGeom prst="rect">
-            <a:avLst/>
-          </a:prstGeom>
-        </p:spPr>
-      </p:pic>
-      <p:pic>
-        <p:nvPicPr>
-          <p:cNvPr id="5" name="Picture 4">
-            <a:extLst>
-              <a:ext uri="{FF2B5EF4-FFF2-40B4-BE49-F238E27FC236}">
-                <a16:creationId xmlns:a16="http://schemas.microsoft.com/office/drawing/2014/main" id="{CD54CDE8-FE5C-9E48-B2F7-1FCCEA443569}"/>
-              </a:ext>
-            </a:extLst>
-          </p:cNvPr>
-          <p:cNvPicPr>
-            <a:picLocks noChangeAspect="1"/>
-          </p:cNvPicPr>
-          <p:nvPr/>
-        </p:nvPicPr>
-        <p:blipFill>
-          <a:blip r:embed="rId4"/>
-          <a:stretch>
-            <a:fillRect/>
-          </a:stretch>
-        </p:blipFill>
-        <p:spPr>
-          <a:xfrm>
-            <a:off x="3368850" y="1158240"/>
-            <a:ext cx="3008073" cy="4227322"/>
-          </a:xfrm>
-          <a:prstGeom prst="rect">
-            <a:avLst/>
-          </a:prstGeom>
-        </p:spPr>
-      </p:pic>
-      <p:pic>
-        <p:nvPicPr>
-          <p:cNvPr id="7" name="Picture 6">
-            <a:extLst>
-              <a:ext uri="{FF2B5EF4-FFF2-40B4-BE49-F238E27FC236}">
-                <a16:creationId xmlns:a16="http://schemas.microsoft.com/office/drawing/2014/main" id="{9F98B96C-1659-694A-BA0E-C473CB207273}"/>
-              </a:ext>
-            </a:extLst>
-          </p:cNvPr>
-          <p:cNvPicPr>
-            <a:picLocks noChangeAspect="1"/>
-          </p:cNvPicPr>
-          <p:nvPr/>
-        </p:nvPicPr>
-        <p:blipFill>
-          <a:blip r:embed="rId5"/>
-          <a:stretch>
-            <a:fillRect/>
-          </a:stretch>
-        </p:blipFill>
-        <p:spPr>
-          <a:xfrm>
-            <a:off x="8452384" y="1718916"/>
-            <a:ext cx="2776683" cy="3666646"/>
-          </a:xfrm>
-          <a:prstGeom prst="rect">
-            <a:avLst/>
-          </a:prstGeom>
-        </p:spPr>
-      </p:pic>
-      <p:pic>
-        <p:nvPicPr>
-          <p:cNvPr id="9" name="Picture 8">
-            <a:extLst>
-              <a:ext uri="{FF2B5EF4-FFF2-40B4-BE49-F238E27FC236}">
-                <a16:creationId xmlns:a16="http://schemas.microsoft.com/office/drawing/2014/main" id="{E0117D3F-FA97-FD45-96FE-45151738E3E8}"/>
-              </a:ext>
-            </a:extLst>
-          </p:cNvPr>
-          <p:cNvPicPr>
-            <a:picLocks noChangeAspect="1"/>
-          </p:cNvPicPr>
-          <p:nvPr/>
-        </p:nvPicPr>
-        <p:blipFill>
-          <a:blip r:embed="rId6"/>
-          <a:stretch>
-            <a:fillRect/>
-          </a:stretch>
-        </p:blipFill>
-        <p:spPr>
-          <a:xfrm>
-            <a:off x="5958823" y="1158240"/>
-            <a:ext cx="3008073" cy="4227322"/>
-          </a:xfrm>
-          <a:prstGeom prst="rect">
-            <a:avLst/>
-          </a:prstGeom>
-        </p:spPr>
-      </p:pic>
+        </p:grpSpPr>
+        <p:pic>
+          <p:nvPicPr>
+            <p:cNvPr id="4" name="Picture 3">
+              <a:extLst>
+                <a:ext uri="{FF2B5EF4-FFF2-40B4-BE49-F238E27FC236}">
+                  <a16:creationId xmlns:a16="http://schemas.microsoft.com/office/drawing/2014/main" id="{E3122E3A-90A7-1740-8EBE-E17DDFF2EB34}"/>
+                </a:ext>
+              </a:extLst>
+            </p:cNvPr>
+            <p:cNvPicPr>
+              <a:picLocks noChangeAspect="1"/>
+            </p:cNvPicPr>
+            <p:nvPr/>
+          </p:nvPicPr>
+          <p:blipFill rotWithShape="1">
+            <a:blip r:embed="rId3"/>
+            <a:srcRect l="10832" t="13264" r="25354" b="10031"/>
+            <a:stretch/>
+          </p:blipFill>
+          <p:spPr>
+            <a:xfrm>
+              <a:off x="660400" y="2042081"/>
+              <a:ext cx="1408135" cy="2378657"/>
+            </a:xfrm>
+            <a:prstGeom prst="rect">
+              <a:avLst/>
+            </a:prstGeom>
+          </p:spPr>
+        </p:pic>
+        <p:pic>
+          <p:nvPicPr>
+            <p:cNvPr id="5" name="Picture 4">
+              <a:extLst>
+                <a:ext uri="{FF2B5EF4-FFF2-40B4-BE49-F238E27FC236}">
+                  <a16:creationId xmlns:a16="http://schemas.microsoft.com/office/drawing/2014/main" id="{CD54CDE8-FE5C-9E48-B2F7-1FCCEA443569}"/>
+                </a:ext>
+              </a:extLst>
+            </p:cNvPr>
+            <p:cNvPicPr>
+              <a:picLocks noChangeAspect="1"/>
+            </p:cNvPicPr>
+            <p:nvPr/>
+          </p:nvPicPr>
+          <p:blipFill rotWithShape="1">
+            <a:blip r:embed="rId4"/>
+            <a:srcRect l="10162" t="13264" r="24972" b="10031"/>
+            <a:stretch/>
+          </p:blipFill>
+          <p:spPr>
+            <a:xfrm>
+              <a:off x="2472212" y="2042080"/>
+              <a:ext cx="1431366" cy="2378657"/>
+            </a:xfrm>
+            <a:prstGeom prst="rect">
+              <a:avLst/>
+            </a:prstGeom>
+          </p:spPr>
+        </p:pic>
+        <p:pic>
+          <p:nvPicPr>
+            <p:cNvPr id="7" name="Picture 6">
+              <a:extLst>
+                <a:ext uri="{FF2B5EF4-FFF2-40B4-BE49-F238E27FC236}">
+                  <a16:creationId xmlns:a16="http://schemas.microsoft.com/office/drawing/2014/main" id="{9F98B96C-1659-694A-BA0E-C473CB207273}"/>
+                </a:ext>
+              </a:extLst>
+            </p:cNvPr>
+            <p:cNvPicPr>
+              <a:picLocks noChangeAspect="1"/>
+            </p:cNvPicPr>
+            <p:nvPr/>
+          </p:nvPicPr>
+          <p:blipFill rotWithShape="1">
+            <a:blip r:embed="rId5"/>
+            <a:srcRect l="18261" t="14079" r="48259" b="48385"/>
+            <a:stretch/>
+          </p:blipFill>
+          <p:spPr>
+            <a:xfrm>
+              <a:off x="6476190" y="2469913"/>
+              <a:ext cx="1053867" cy="1560219"/>
+            </a:xfrm>
+            <a:prstGeom prst="rect">
+              <a:avLst/>
+            </a:prstGeom>
+            <a:ln>
+              <a:solidFill>
+                <a:schemeClr val="tx1"/>
+              </a:solidFill>
+            </a:ln>
+          </p:spPr>
+        </p:pic>
+        <p:pic>
+          <p:nvPicPr>
+            <p:cNvPr id="9" name="Picture 8">
+              <a:extLst>
+                <a:ext uri="{FF2B5EF4-FFF2-40B4-BE49-F238E27FC236}">
+                  <a16:creationId xmlns:a16="http://schemas.microsoft.com/office/drawing/2014/main" id="{E0117D3F-FA97-FD45-96FE-45151738E3E8}"/>
+                </a:ext>
+              </a:extLst>
+            </p:cNvPr>
+            <p:cNvPicPr>
+              <a:picLocks noChangeAspect="1"/>
+            </p:cNvPicPr>
+            <p:nvPr/>
+          </p:nvPicPr>
+          <p:blipFill rotWithShape="1">
+            <a:blip r:embed="rId6"/>
+            <a:srcRect l="11316" t="13264" r="23252" b="10031"/>
+            <a:stretch/>
+          </p:blipFill>
+          <p:spPr>
+            <a:xfrm>
+              <a:off x="4451027" y="2042080"/>
+              <a:ext cx="1443848" cy="2378657"/>
+            </a:xfrm>
+            <a:prstGeom prst="rect">
+              <a:avLst/>
+            </a:prstGeom>
+          </p:spPr>
+        </p:pic>
+        <p:sp>
+          <p:nvSpPr>
+            <p:cNvPr id="2" name="TextBox 1">
+              <a:extLst>
+                <a:ext uri="{FF2B5EF4-FFF2-40B4-BE49-F238E27FC236}">
+                  <a16:creationId xmlns:a16="http://schemas.microsoft.com/office/drawing/2014/main" id="{FF17C28E-1DB1-B140-8295-8C2936691A54}"/>
+                </a:ext>
+              </a:extLst>
+            </p:cNvPr>
+            <p:cNvSpPr txBox="1"/>
+            <p:nvPr/>
+          </p:nvSpPr>
+          <p:spPr>
+            <a:xfrm>
+              <a:off x="720676" y="4438005"/>
+              <a:ext cx="1265475" cy="356561"/>
+            </a:xfrm>
+            <a:prstGeom prst="rect">
+              <a:avLst/>
+            </a:prstGeom>
+            <a:noFill/>
+          </p:spPr>
+          <p:txBody>
+            <a:bodyPr wrap="square" rtlCol="0">
+              <a:spAutoFit/>
+            </a:bodyPr>
+            <a:lstStyle/>
+            <a:p>
+              <a:r>
+                <a:rPr lang="de-DE" sz="1400" dirty="0"/>
+                <a:t>Input </a:t>
+              </a:r>
+              <a:r>
+                <a:rPr lang="de-DE" sz="1400" dirty="0" err="1"/>
+                <a:t>data</a:t>
+              </a:r>
+              <a:endParaRPr lang="de-DE" sz="1400" dirty="0"/>
+            </a:p>
+            <a:p>
+              <a:r>
+                <a:rPr lang="de-DE" sz="1400" dirty="0"/>
+                <a:t>(</a:t>
+              </a:r>
+              <a:r>
+                <a:rPr lang="de-DE" sz="1400" dirty="0" err="1"/>
+                <a:t>grayscale</a:t>
+              </a:r>
+              <a:r>
+                <a:rPr lang="de-DE" sz="1400" dirty="0"/>
+                <a:t> </a:t>
+              </a:r>
+              <a:r>
+                <a:rPr lang="de-DE" sz="1400" dirty="0" err="1"/>
+                <a:t>image</a:t>
+              </a:r>
+              <a:r>
+                <a:rPr lang="de-DE" sz="1400" dirty="0"/>
+                <a:t>)</a:t>
+              </a:r>
+            </a:p>
+          </p:txBody>
+        </p:sp>
+        <p:sp>
+          <p:nvSpPr>
+            <p:cNvPr id="8" name="TextBox 7">
+              <a:extLst>
+                <a:ext uri="{FF2B5EF4-FFF2-40B4-BE49-F238E27FC236}">
+                  <a16:creationId xmlns:a16="http://schemas.microsoft.com/office/drawing/2014/main" id="{383C5D8E-F28C-AD40-B0F0-6CEE9181740F}"/>
+                </a:ext>
+              </a:extLst>
+            </p:cNvPr>
+            <p:cNvSpPr txBox="1"/>
+            <p:nvPr/>
+          </p:nvSpPr>
+          <p:spPr>
+            <a:xfrm>
+              <a:off x="2472212" y="4443815"/>
+              <a:ext cx="1676421" cy="650200"/>
+            </a:xfrm>
+            <a:prstGeom prst="rect">
+              <a:avLst/>
+            </a:prstGeom>
+            <a:noFill/>
+          </p:spPr>
+          <p:txBody>
+            <a:bodyPr wrap="square" rtlCol="0">
+              <a:spAutoFit/>
+            </a:bodyPr>
+            <a:lstStyle/>
+            <a:p>
+              <a:r>
+                <a:rPr lang="de-DE" sz="1400" dirty="0" err="1"/>
+                <a:t>Semantic</a:t>
+              </a:r>
+              <a:r>
+                <a:rPr lang="de-DE" sz="1400" dirty="0"/>
+                <a:t> </a:t>
+              </a:r>
+            </a:p>
+            <a:p>
+              <a:r>
+                <a:rPr lang="de-DE" sz="1400" dirty="0" err="1"/>
+                <a:t>foreground</a:t>
+              </a:r>
+              <a:r>
+                <a:rPr lang="de-DE" sz="1400" dirty="0"/>
+                <a:t>/</a:t>
+              </a:r>
+              <a:r>
+                <a:rPr lang="de-DE" sz="1400" dirty="0" err="1"/>
+                <a:t>background</a:t>
+              </a:r>
+              <a:endParaRPr lang="de-DE" sz="1400" dirty="0"/>
+            </a:p>
+            <a:p>
+              <a:r>
+                <a:rPr lang="de-DE" sz="1400" dirty="0" err="1"/>
+                <a:t>segmentation</a:t>
+              </a:r>
+              <a:r>
+                <a:rPr lang="de-DE" sz="1400" dirty="0"/>
+                <a:t> </a:t>
+              </a:r>
+            </a:p>
+            <a:p>
+              <a:r>
+                <a:rPr lang="de-DE" sz="1400" dirty="0"/>
+                <a:t>(</a:t>
+              </a:r>
+              <a:r>
+                <a:rPr lang="de-DE" sz="1400" dirty="0" err="1"/>
+                <a:t>binary</a:t>
+              </a:r>
+              <a:r>
+                <a:rPr lang="de-DE" sz="1400" dirty="0"/>
+                <a:t> </a:t>
+              </a:r>
+              <a:r>
+                <a:rPr lang="de-DE" sz="1400" dirty="0" err="1"/>
+                <a:t>image</a:t>
+              </a:r>
+              <a:r>
+                <a:rPr lang="de-DE" sz="1400" dirty="0"/>
+                <a:t>)</a:t>
+              </a:r>
+            </a:p>
+          </p:txBody>
+        </p:sp>
+        <p:sp>
+          <p:nvSpPr>
+            <p:cNvPr id="10" name="TextBox 9">
+              <a:extLst>
+                <a:ext uri="{FF2B5EF4-FFF2-40B4-BE49-F238E27FC236}">
+                  <a16:creationId xmlns:a16="http://schemas.microsoft.com/office/drawing/2014/main" id="{B25B5245-5B9E-C54D-A288-704B462F079A}"/>
+                </a:ext>
+              </a:extLst>
+            </p:cNvPr>
+            <p:cNvSpPr txBox="1"/>
+            <p:nvPr/>
+          </p:nvSpPr>
+          <p:spPr>
+            <a:xfrm>
+              <a:off x="4390677" y="4458077"/>
+              <a:ext cx="1603068" cy="356561"/>
+            </a:xfrm>
+            <a:prstGeom prst="rect">
+              <a:avLst/>
+            </a:prstGeom>
+            <a:noFill/>
+          </p:spPr>
+          <p:txBody>
+            <a:bodyPr wrap="square" rtlCol="0">
+              <a:spAutoFit/>
+            </a:bodyPr>
+            <a:lstStyle/>
+            <a:p>
+              <a:r>
+                <a:rPr lang="de-DE" sz="1400" dirty="0"/>
+                <a:t>Instance </a:t>
+              </a:r>
+              <a:r>
+                <a:rPr lang="de-DE" sz="1400" dirty="0" err="1"/>
+                <a:t>segmentation</a:t>
+              </a:r>
+              <a:endParaRPr lang="de-DE" sz="1400" dirty="0"/>
+            </a:p>
+            <a:p>
+              <a:r>
+                <a:rPr lang="de-DE" sz="1400" dirty="0"/>
+                <a:t>(</a:t>
+              </a:r>
+              <a:r>
+                <a:rPr lang="de-DE" sz="1400" dirty="0" err="1"/>
+                <a:t>label</a:t>
+              </a:r>
+              <a:r>
+                <a:rPr lang="de-DE" sz="1400" dirty="0"/>
+                <a:t> </a:t>
+              </a:r>
+              <a:r>
+                <a:rPr lang="de-DE" sz="1400" dirty="0" err="1"/>
+                <a:t>mask</a:t>
+              </a:r>
+              <a:r>
+                <a:rPr lang="de-DE" sz="1400" dirty="0"/>
+                <a:t> </a:t>
+              </a:r>
+              <a:r>
+                <a:rPr lang="de-DE" sz="1400" dirty="0" err="1"/>
+                <a:t>image</a:t>
+              </a:r>
+              <a:r>
+                <a:rPr lang="de-DE" sz="1400" dirty="0"/>
+                <a:t>)</a:t>
+              </a:r>
+            </a:p>
+          </p:txBody>
+        </p:sp>
+        <p:sp>
+          <p:nvSpPr>
+            <p:cNvPr id="11" name="TextBox 10">
+              <a:extLst>
+                <a:ext uri="{FF2B5EF4-FFF2-40B4-BE49-F238E27FC236}">
+                  <a16:creationId xmlns:a16="http://schemas.microsoft.com/office/drawing/2014/main" id="{A769FCA1-1028-494D-81F0-8D8869A042AC}"/>
+                </a:ext>
+              </a:extLst>
+            </p:cNvPr>
+            <p:cNvSpPr txBox="1"/>
+            <p:nvPr/>
+          </p:nvSpPr>
+          <p:spPr>
+            <a:xfrm>
+              <a:off x="6670783" y="4459214"/>
+              <a:ext cx="630814" cy="356561"/>
+            </a:xfrm>
+            <a:prstGeom prst="rect">
+              <a:avLst/>
+            </a:prstGeom>
+            <a:noFill/>
+          </p:spPr>
+          <p:txBody>
+            <a:bodyPr wrap="square" rtlCol="0">
+              <a:spAutoFit/>
+            </a:bodyPr>
+            <a:lstStyle/>
+            <a:p>
+              <a:r>
+                <a:rPr lang="de-DE" sz="1400" dirty="0" err="1"/>
+                <a:t>Results</a:t>
+              </a:r>
+              <a:endParaRPr lang="de-DE" sz="1400" dirty="0"/>
+            </a:p>
+            <a:p>
+              <a:r>
+                <a:rPr lang="de-DE" sz="1400" dirty="0" err="1"/>
+                <a:t>table</a:t>
+              </a:r>
+              <a:endParaRPr lang="de-DE" sz="1400" dirty="0"/>
+            </a:p>
+          </p:txBody>
+        </p:sp>
+        <p:sp>
+          <p:nvSpPr>
+            <p:cNvPr id="12" name="TextBox 11">
+              <a:extLst>
+                <a:ext uri="{FF2B5EF4-FFF2-40B4-BE49-F238E27FC236}">
+                  <a16:creationId xmlns:a16="http://schemas.microsoft.com/office/drawing/2014/main" id="{B5C07582-CBFB-4446-B0C7-B533B41A543E}"/>
+                </a:ext>
+              </a:extLst>
+            </p:cNvPr>
+            <p:cNvSpPr txBox="1"/>
+            <p:nvPr/>
+          </p:nvSpPr>
+          <p:spPr>
+            <a:xfrm rot="16200000">
+              <a:off x="1889467" y="3155670"/>
+              <a:ext cx="806183" cy="206042"/>
+            </a:xfrm>
+            <a:prstGeom prst="rect">
+              <a:avLst/>
+            </a:prstGeom>
+            <a:solidFill>
+              <a:schemeClr val="accent1">
+                <a:lumMod val="20000"/>
+                <a:lumOff val="80000"/>
+              </a:schemeClr>
+            </a:solidFill>
+          </p:spPr>
+          <p:txBody>
+            <a:bodyPr wrap="square" rtlCol="0">
+              <a:spAutoFit/>
+            </a:bodyPr>
+            <a:lstStyle/>
+            <a:p>
+              <a:pPr algn="ctr"/>
+              <a:r>
+                <a:rPr lang="de-DE" sz="1400" dirty="0" err="1"/>
+                <a:t>Threshold</a:t>
+              </a:r>
+              <a:endParaRPr lang="de-DE" sz="1400" dirty="0"/>
+            </a:p>
+          </p:txBody>
+        </p:sp>
+        <p:sp>
+          <p:nvSpPr>
+            <p:cNvPr id="13" name="TextBox 12">
+              <a:extLst>
+                <a:ext uri="{FF2B5EF4-FFF2-40B4-BE49-F238E27FC236}">
+                  <a16:creationId xmlns:a16="http://schemas.microsoft.com/office/drawing/2014/main" id="{D7A75797-AF22-2B44-9566-298A5F13FF6F}"/>
+                </a:ext>
+              </a:extLst>
+            </p:cNvPr>
+            <p:cNvSpPr txBox="1"/>
+            <p:nvPr/>
+          </p:nvSpPr>
+          <p:spPr>
+            <a:xfrm rot="16200000">
+              <a:off x="3091685" y="3155670"/>
+              <a:ext cx="2171235" cy="206042"/>
+            </a:xfrm>
+            <a:prstGeom prst="rect">
+              <a:avLst/>
+            </a:prstGeom>
+            <a:solidFill>
+              <a:schemeClr val="accent1">
+                <a:lumMod val="20000"/>
+                <a:lumOff val="80000"/>
+              </a:schemeClr>
+            </a:solidFill>
+          </p:spPr>
+          <p:txBody>
+            <a:bodyPr wrap="square" rtlCol="0">
+              <a:spAutoFit/>
+            </a:bodyPr>
+            <a:lstStyle/>
+            <a:p>
+              <a:pPr algn="ctr"/>
+              <a:r>
+                <a:rPr lang="de-DE" sz="1400" dirty="0" err="1"/>
+                <a:t>Connected</a:t>
+              </a:r>
+              <a:r>
+                <a:rPr lang="de-DE" sz="1400" dirty="0"/>
+                <a:t> </a:t>
+              </a:r>
+              <a:r>
+                <a:rPr lang="de-DE" sz="1400" dirty="0" err="1"/>
+                <a:t>component</a:t>
+              </a:r>
+              <a:r>
+                <a:rPr lang="de-DE" sz="1400" dirty="0"/>
+                <a:t> </a:t>
+              </a:r>
+              <a:r>
+                <a:rPr lang="de-DE" sz="1400" dirty="0" err="1"/>
+                <a:t>labelling</a:t>
+              </a:r>
+              <a:endParaRPr lang="de-DE" sz="1400" dirty="0"/>
+            </a:p>
+          </p:txBody>
+        </p:sp>
+        <p:sp>
+          <p:nvSpPr>
+            <p:cNvPr id="14" name="TextBox 13">
+              <a:extLst>
+                <a:ext uri="{FF2B5EF4-FFF2-40B4-BE49-F238E27FC236}">
+                  <a16:creationId xmlns:a16="http://schemas.microsoft.com/office/drawing/2014/main" id="{8AC61399-F834-2C46-ACD6-27D7A3784689}"/>
+                </a:ext>
+              </a:extLst>
+            </p:cNvPr>
+            <p:cNvSpPr txBox="1"/>
+            <p:nvPr/>
+          </p:nvSpPr>
+          <p:spPr>
+            <a:xfrm rot="16200000">
+              <a:off x="5126007" y="3155668"/>
+              <a:ext cx="2085186" cy="206042"/>
+            </a:xfrm>
+            <a:prstGeom prst="rect">
+              <a:avLst/>
+            </a:prstGeom>
+            <a:solidFill>
+              <a:schemeClr val="accent1">
+                <a:lumMod val="20000"/>
+                <a:lumOff val="80000"/>
+              </a:schemeClr>
+            </a:solidFill>
+          </p:spPr>
+          <p:txBody>
+            <a:bodyPr wrap="square" rtlCol="0">
+              <a:spAutoFit/>
+            </a:bodyPr>
+            <a:lstStyle/>
+            <a:p>
+              <a:pPr algn="ctr"/>
+              <a:r>
+                <a:rPr lang="de-DE" sz="1400" dirty="0"/>
+                <a:t>Instance </a:t>
+              </a:r>
+              <a:r>
+                <a:rPr lang="de-DE" sz="1400" dirty="0" err="1"/>
+                <a:t>shape</a:t>
+              </a:r>
+              <a:r>
+                <a:rPr lang="de-DE" sz="1400" dirty="0"/>
+                <a:t> </a:t>
+              </a:r>
+              <a:r>
+                <a:rPr lang="de-DE" sz="1400" dirty="0" err="1"/>
+                <a:t>measurements</a:t>
+              </a:r>
+              <a:endParaRPr lang="de-DE" sz="1400" dirty="0"/>
+            </a:p>
+          </p:txBody>
+        </p:sp>
+      </p:grpSp>
     </p:spTree>
     <p:extLst>
       <p:ext uri="{BB962C8B-B14F-4D97-AF65-F5344CB8AC3E}">

</xml_diff>

<commit_message>
Improve String concat module
</commit_message>
<xml_diff>
--- a/figures/resources/workflow_segment_2d_nuclei_measure_shape.pptx
+++ b/figures/resources/workflow_segment_2d_nuclei_measure_shape.pptx
@@ -3884,9 +3884,9 @@
         <p:grpSpPr>
           <a:xfrm>
             <a:off x="660400" y="541867"/>
-            <a:ext cx="10261600" cy="4478428"/>
+            <a:ext cx="9920336" cy="4469902"/>
             <a:chOff x="660400" y="2042080"/>
-            <a:chExt cx="6869657" cy="3051935"/>
+            <a:chExt cx="6641197" cy="3046125"/>
           </a:xfrm>
         </p:grpSpPr>
         <p:pic>
@@ -3963,13 +3963,13 @@
           </p:nvPicPr>
           <p:blipFill rotWithShape="1">
             <a:blip r:embed="rId5"/>
-            <a:srcRect l="18261" t="14079" r="48259" b="48385"/>
+            <a:srcRect l="18261" t="15169" r="48259" b="48384"/>
             <a:stretch/>
           </p:blipFill>
           <p:spPr>
             <a:xfrm>
-              <a:off x="6476190" y="2469913"/>
-              <a:ext cx="1053867" cy="1560219"/>
+              <a:off x="6484527" y="2682505"/>
+              <a:ext cx="817070" cy="1174533"/>
             </a:xfrm>
             <a:prstGeom prst="rect">
               <a:avLst/>
@@ -4086,7 +4086,7 @@
           </p:nvSpPr>
           <p:spPr>
             <a:xfrm>
-              <a:off x="2472212" y="4443815"/>
+              <a:off x="2472212" y="4438005"/>
               <a:ext cx="1676421" cy="650200"/>
             </a:xfrm>
             <a:prstGeom prst="rect">
@@ -4172,7 +4172,7 @@
           </p:nvSpPr>
           <p:spPr>
             <a:xfrm>
-              <a:off x="4390677" y="4458077"/>
+              <a:off x="4390677" y="4438005"/>
               <a:ext cx="1603068" cy="356561"/>
             </a:xfrm>
             <a:prstGeom prst="rect">
@@ -4242,7 +4242,7 @@
           </p:nvSpPr>
           <p:spPr>
             <a:xfrm>
-              <a:off x="6670783" y="4459214"/>
+              <a:off x="6670783" y="4438005"/>
               <a:ext cx="630814" cy="356561"/>
             </a:xfrm>
             <a:prstGeom prst="rect">
@@ -4406,8 +4406,12 @@
             <a:p>
               <a:pPr algn="ctr"/>
               <a:r>
+                <a:rPr lang="de-DE" sz="1400" dirty="0" err="1"/>
+                <a:t>Object</a:t>
+              </a:r>
+              <a:r>
                 <a:rPr lang="de-DE" sz="1400" dirty="0"/>
-                <a:t>Instance </a:t>
+                <a:t> </a:t>
               </a:r>
               <a:r>
                 <a:rPr lang="de-DE" sz="1400" dirty="0" err="1"/>

</xml_diff>